<commit_message>
Added simplicial healing to SimplexTheory module
</commit_message>
<xml_diff>
--- a/Paper Figures/Figures.pptx
+++ b/Paper Figures/Figures.pptx
@@ -481,7 +481,7 @@
             <a:fld id="{A549ADDE-98E8-4149-84E6-9A28F99CE161}" type="datetimeFigureOut">
               <a:rPr lang="en-US" smtClean="0"/>
               <a:pPr/>
-              <a:t>4/9/2020</a:t>
+              <a:t>4/30/2020</a:t>
             </a:fld>
             <a:endParaRPr lang="en-US"/>
           </a:p>
@@ -656,7 +656,7 @@
             <a:fld id="{A549ADDE-98E8-4149-84E6-9A28F99CE161}" type="datetimeFigureOut">
               <a:rPr lang="en-US" smtClean="0"/>
               <a:pPr/>
-              <a:t>4/9/2020</a:t>
+              <a:t>4/30/2020</a:t>
             </a:fld>
             <a:endParaRPr lang="en-US"/>
           </a:p>
@@ -821,7 +821,7 @@
             <a:fld id="{A549ADDE-98E8-4149-84E6-9A28F99CE161}" type="datetimeFigureOut">
               <a:rPr lang="en-US" smtClean="0"/>
               <a:pPr/>
-              <a:t>4/9/2020</a:t>
+              <a:t>4/30/2020</a:t>
             </a:fld>
             <a:endParaRPr lang="en-US"/>
           </a:p>
@@ -1063,7 +1063,7 @@
             <a:fld id="{A549ADDE-98E8-4149-84E6-9A28F99CE161}" type="datetimeFigureOut">
               <a:rPr lang="en-US" smtClean="0"/>
               <a:pPr/>
-              <a:t>4/9/2020</a:t>
+              <a:t>4/30/2020</a:t>
             </a:fld>
             <a:endParaRPr lang="en-US"/>
           </a:p>
@@ -1345,7 +1345,7 @@
             <a:fld id="{A549ADDE-98E8-4149-84E6-9A28F99CE161}" type="datetimeFigureOut">
               <a:rPr lang="en-US" smtClean="0"/>
               <a:pPr/>
-              <a:t>4/9/2020</a:t>
+              <a:t>4/30/2020</a:t>
             </a:fld>
             <a:endParaRPr lang="en-US"/>
           </a:p>
@@ -1761,7 +1761,7 @@
             <a:fld id="{A549ADDE-98E8-4149-84E6-9A28F99CE161}" type="datetimeFigureOut">
               <a:rPr lang="en-US" smtClean="0"/>
               <a:pPr/>
-              <a:t>4/9/2020</a:t>
+              <a:t>4/30/2020</a:t>
             </a:fld>
             <a:endParaRPr lang="en-US"/>
           </a:p>
@@ -1943,7 +1943,7 @@
             <a:fld id="{A549ADDE-98E8-4149-84E6-9A28F99CE161}" type="datetimeFigureOut">
               <a:rPr lang="en-US" smtClean="0"/>
               <a:pPr/>
-              <a:t>4/9/2020</a:t>
+              <a:t>4/30/2020</a:t>
             </a:fld>
             <a:endParaRPr lang="en-US"/>
           </a:p>
@@ -2215,7 +2215,7 @@
             <a:fld id="{A549ADDE-98E8-4149-84E6-9A28F99CE161}" type="datetimeFigureOut">
               <a:rPr lang="en-US" smtClean="0"/>
               <a:pPr/>
-              <a:t>4/9/2020</a:t>
+              <a:t>4/30/2020</a:t>
             </a:fld>
             <a:endParaRPr lang="en-US"/>
           </a:p>
@@ -2464,7 +2464,7 @@
             <a:fld id="{A549ADDE-98E8-4149-84E6-9A28F99CE161}" type="datetimeFigureOut">
               <a:rPr lang="en-US" smtClean="0"/>
               <a:pPr/>
-              <a:t>4/9/2020</a:t>
+              <a:t>4/30/2020</a:t>
             </a:fld>
             <a:endParaRPr lang="en-US"/>
           </a:p>
@@ -2672,7 +2672,7 @@
             <a:fld id="{A549ADDE-98E8-4149-84E6-9A28F99CE161}" type="datetimeFigureOut">
               <a:rPr lang="en-US" smtClean="0"/>
               <a:pPr/>
-              <a:t>4/9/2020</a:t>
+              <a:t>4/30/2020</a:t>
             </a:fld>
             <a:endParaRPr lang="en-US"/>
           </a:p>
@@ -26309,8 +26309,8 @@
             </a:p>
           </p:txBody>
         </p:sp>
-        <mc:AlternateContent xmlns:mc="http://schemas.openxmlformats.org/markup-compatibility/2006">
-          <mc:Choice xmlns:a14="http://schemas.microsoft.com/office/drawing/2010/main" Requires="a14">
+        <mc:AlternateContent xmlns:mc="http://schemas.openxmlformats.org/markup-compatibility/2006" xmlns:a14="http://schemas.microsoft.com/office/drawing/2010/main">
+          <mc:Choice Requires="a14">
             <p:sp>
               <p:nvSpPr>
                 <p:cNvPr id="6" name="TextBox 5">
@@ -26358,7 +26358,7 @@
               </p:txBody>
             </p:sp>
           </mc:Choice>
-          <mc:Fallback>
+          <mc:Fallback xmlns="">
             <p:sp>
               <p:nvSpPr>
                 <p:cNvPr id="6" name="TextBox 5">
@@ -26403,8 +26403,8 @@
             </p:sp>
           </mc:Fallback>
         </mc:AlternateContent>
-        <mc:AlternateContent xmlns:mc="http://schemas.openxmlformats.org/markup-compatibility/2006">
-          <mc:Choice xmlns:a14="http://schemas.microsoft.com/office/drawing/2010/main" Requires="a14">
+        <mc:AlternateContent xmlns:mc="http://schemas.openxmlformats.org/markup-compatibility/2006" xmlns:a14="http://schemas.microsoft.com/office/drawing/2010/main">
+          <mc:Choice Requires="a14">
             <p:sp>
               <p:nvSpPr>
                 <p:cNvPr id="7" name="TextBox 6">
@@ -26458,7 +26458,7 @@
               </p:txBody>
             </p:sp>
           </mc:Choice>
-          <mc:Fallback>
+          <mc:Fallback xmlns="">
             <p:sp>
               <p:nvSpPr>
                 <p:cNvPr id="7" name="TextBox 6">
@@ -26503,8 +26503,8 @@
             </p:sp>
           </mc:Fallback>
         </mc:AlternateContent>
-        <mc:AlternateContent xmlns:mc="http://schemas.openxmlformats.org/markup-compatibility/2006">
-          <mc:Choice xmlns:a14="http://schemas.microsoft.com/office/drawing/2010/main" Requires="a14">
+        <mc:AlternateContent xmlns:mc="http://schemas.openxmlformats.org/markup-compatibility/2006" xmlns:a14="http://schemas.microsoft.com/office/drawing/2010/main">
+          <mc:Choice Requires="a14">
             <p:sp>
               <p:nvSpPr>
                 <p:cNvPr id="9" name="TextBox 8">
@@ -26622,7 +26622,7 @@
               </p:txBody>
             </p:sp>
           </mc:Choice>
-          <mc:Fallback>
+          <mc:Fallback xmlns="">
             <p:sp>
               <p:nvSpPr>
                 <p:cNvPr id="9" name="TextBox 8">
@@ -26667,8 +26667,8 @@
             </p:sp>
           </mc:Fallback>
         </mc:AlternateContent>
-        <mc:AlternateContent xmlns:mc="http://schemas.openxmlformats.org/markup-compatibility/2006">
-          <mc:Choice xmlns:a14="http://schemas.microsoft.com/office/drawing/2010/main" Requires="a14">
+        <mc:AlternateContent xmlns:mc="http://schemas.openxmlformats.org/markup-compatibility/2006" xmlns:a14="http://schemas.microsoft.com/office/drawing/2010/main">
+          <mc:Choice Requires="a14">
             <p:sp>
               <p:nvSpPr>
                 <p:cNvPr id="10" name="TextBox 9">
@@ -26718,7 +26718,7 @@
               </p:txBody>
             </p:sp>
           </mc:Choice>
-          <mc:Fallback>
+          <mc:Fallback xmlns="">
             <p:sp>
               <p:nvSpPr>
                 <p:cNvPr id="10" name="TextBox 9">
@@ -26763,8 +26763,8 @@
             </p:sp>
           </mc:Fallback>
         </mc:AlternateContent>
-        <mc:AlternateContent xmlns:mc="http://schemas.openxmlformats.org/markup-compatibility/2006">
-          <mc:Choice xmlns:a14="http://schemas.microsoft.com/office/drawing/2010/main" Requires="a14">
+        <mc:AlternateContent xmlns:mc="http://schemas.openxmlformats.org/markup-compatibility/2006" xmlns:a14="http://schemas.microsoft.com/office/drawing/2010/main">
+          <mc:Choice Requires="a14">
             <p:sp>
               <p:nvSpPr>
                 <p:cNvPr id="11" name="TextBox 10">
@@ -26820,7 +26820,7 @@
               </p:txBody>
             </p:sp>
           </mc:Choice>
-          <mc:Fallback>
+          <mc:Fallback xmlns="">
             <p:sp>
               <p:nvSpPr>
                 <p:cNvPr id="11" name="TextBox 10">
@@ -26865,8 +26865,8 @@
             </p:sp>
           </mc:Fallback>
         </mc:AlternateContent>
-        <mc:AlternateContent xmlns:mc="http://schemas.openxmlformats.org/markup-compatibility/2006">
-          <mc:Choice xmlns:a14="http://schemas.microsoft.com/office/drawing/2010/main" Requires="a14">
+        <mc:AlternateContent xmlns:mc="http://schemas.openxmlformats.org/markup-compatibility/2006" xmlns:a14="http://schemas.microsoft.com/office/drawing/2010/main">
+          <mc:Choice Requires="a14">
             <p:sp>
               <p:nvSpPr>
                 <p:cNvPr id="12" name="TextBox 11">
@@ -26996,7 +26996,7 @@
               </p:txBody>
             </p:sp>
           </mc:Choice>
-          <mc:Fallback>
+          <mc:Fallback xmlns="">
             <p:sp>
               <p:nvSpPr>
                 <p:cNvPr id="12" name="TextBox 11">
@@ -27263,8 +27263,8 @@
             </a:p>
           </p:txBody>
         </p:sp>
-        <mc:AlternateContent xmlns:mc="http://schemas.openxmlformats.org/markup-compatibility/2006">
-          <mc:Choice xmlns:a14="http://schemas.microsoft.com/office/drawing/2010/main" Requires="a14">
+        <mc:AlternateContent xmlns:mc="http://schemas.openxmlformats.org/markup-compatibility/2006" xmlns:a14="http://schemas.microsoft.com/office/drawing/2010/main">
+          <mc:Choice Requires="a14">
             <p:sp>
               <p:nvSpPr>
                 <p:cNvPr id="16" name="TextBox 15">
@@ -27320,7 +27320,7 @@
               </p:txBody>
             </p:sp>
           </mc:Choice>
-          <mc:Fallback>
+          <mc:Fallback xmlns="">
             <p:sp>
               <p:nvSpPr>
                 <p:cNvPr id="16" name="TextBox 15">
@@ -37307,7 +37307,7 @@
         </p:nvGrpSpPr>
         <p:grpSpPr>
           <a:xfrm>
-            <a:off x="8220469" y="13999543"/>
+            <a:off x="13223023" y="13732029"/>
             <a:ext cx="3151448" cy="3110563"/>
             <a:chOff x="8220469" y="13999543"/>
             <a:chExt cx="3151448" cy="3110563"/>
@@ -37912,28 +37912,23 @@
                 <a:gsLst>
                   <a:gs pos="0">
                     <a:schemeClr val="accent2">
-                      <a:lumMod val="89000"/>
+                      <a:lumMod val="67000"/>
                     </a:schemeClr>
                   </a:gs>
-                  <a:gs pos="23000">
+                  <a:gs pos="48000">
                     <a:schemeClr val="accent2">
-                      <a:lumMod val="89000"/>
+                      <a:lumMod val="97000"/>
+                      <a:lumOff val="3000"/>
                     </a:schemeClr>
                   </a:gs>
-                  <a:gs pos="69000">
+                  <a:gs pos="100000">
                     <a:schemeClr val="accent2">
-                      <a:lumMod val="75000"/>
-                    </a:schemeClr>
-                  </a:gs>
-                  <a:gs pos="97000">
-                    <a:schemeClr val="accent2">
-                      <a:lumMod val="70000"/>
+                      <a:lumMod val="60000"/>
+                      <a:lumOff val="40000"/>
                     </a:schemeClr>
                   </a:gs>
                 </a:gsLst>
-                <a:path path="circle">
-                  <a:fillToRect l="50000" t="50000" r="50000" b="50000"/>
-                </a:path>
+                <a:lin ang="16200000" scaled="1"/>
                 <a:tileRect/>
               </a:gradFill>
               <a:ln>
@@ -37991,28 +37986,23 @@
                 <a:gsLst>
                   <a:gs pos="0">
                     <a:schemeClr val="accent2">
-                      <a:lumMod val="89000"/>
+                      <a:lumMod val="67000"/>
                     </a:schemeClr>
                   </a:gs>
-                  <a:gs pos="23000">
+                  <a:gs pos="48000">
                     <a:schemeClr val="accent2">
-                      <a:lumMod val="89000"/>
+                      <a:lumMod val="97000"/>
+                      <a:lumOff val="3000"/>
                     </a:schemeClr>
                   </a:gs>
-                  <a:gs pos="69000">
+                  <a:gs pos="100000">
                     <a:schemeClr val="accent2">
-                      <a:lumMod val="75000"/>
-                    </a:schemeClr>
-                  </a:gs>
-                  <a:gs pos="97000">
-                    <a:schemeClr val="accent2">
-                      <a:lumMod val="70000"/>
+                      <a:lumMod val="60000"/>
+                      <a:lumOff val="40000"/>
                     </a:schemeClr>
                   </a:gs>
                 </a:gsLst>
-                <a:path path="circle">
-                  <a:fillToRect l="50000" t="50000" r="50000" b="50000"/>
-                </a:path>
+                <a:lin ang="16200000" scaled="1"/>
                 <a:tileRect/>
               </a:gradFill>
               <a:ln>
@@ -38070,28 +38060,23 @@
                 <a:gsLst>
                   <a:gs pos="0">
                     <a:schemeClr val="accent3">
-                      <a:lumMod val="89000"/>
+                      <a:lumMod val="67000"/>
                     </a:schemeClr>
                   </a:gs>
-                  <a:gs pos="23000">
+                  <a:gs pos="48000">
                     <a:schemeClr val="accent3">
-                      <a:lumMod val="89000"/>
+                      <a:lumMod val="97000"/>
+                      <a:lumOff val="3000"/>
                     </a:schemeClr>
                   </a:gs>
-                  <a:gs pos="69000">
+                  <a:gs pos="100000">
                     <a:schemeClr val="accent3">
-                      <a:lumMod val="75000"/>
-                    </a:schemeClr>
-                  </a:gs>
-                  <a:gs pos="97000">
-                    <a:schemeClr val="accent3">
-                      <a:lumMod val="70000"/>
+                      <a:lumMod val="60000"/>
+                      <a:lumOff val="40000"/>
                     </a:schemeClr>
                   </a:gs>
                 </a:gsLst>
-                <a:path path="circle">
-                  <a:fillToRect l="50000" t="50000" r="50000" b="50000"/>
-                </a:path>
+                <a:lin ang="16200000" scaled="1"/>
                 <a:tileRect/>
               </a:gradFill>
               <a:ln>
@@ -38149,28 +38134,23 @@
                 <a:gsLst>
                   <a:gs pos="0">
                     <a:schemeClr val="accent2">
-                      <a:lumMod val="89000"/>
+                      <a:lumMod val="67000"/>
                     </a:schemeClr>
                   </a:gs>
-                  <a:gs pos="23000">
+                  <a:gs pos="48000">
                     <a:schemeClr val="accent2">
-                      <a:lumMod val="89000"/>
+                      <a:lumMod val="97000"/>
+                      <a:lumOff val="3000"/>
                     </a:schemeClr>
                   </a:gs>
-                  <a:gs pos="69000">
+                  <a:gs pos="100000">
                     <a:schemeClr val="accent2">
-                      <a:lumMod val="75000"/>
-                    </a:schemeClr>
-                  </a:gs>
-                  <a:gs pos="97000">
-                    <a:schemeClr val="accent2">
-                      <a:lumMod val="70000"/>
+                      <a:lumMod val="60000"/>
+                      <a:lumOff val="40000"/>
                     </a:schemeClr>
                   </a:gs>
                 </a:gsLst>
-                <a:path path="circle">
-                  <a:fillToRect l="50000" t="50000" r="50000" b="50000"/>
-                </a:path>
+                <a:lin ang="16200000" scaled="1"/>
                 <a:tileRect/>
               </a:gradFill>
               <a:ln>
@@ -38228,28 +38208,23 @@
                 <a:gsLst>
                   <a:gs pos="0">
                     <a:schemeClr val="accent3">
-                      <a:lumMod val="89000"/>
+                      <a:lumMod val="67000"/>
                     </a:schemeClr>
                   </a:gs>
-                  <a:gs pos="23000">
+                  <a:gs pos="48000">
                     <a:schemeClr val="accent3">
-                      <a:lumMod val="89000"/>
+                      <a:lumMod val="97000"/>
+                      <a:lumOff val="3000"/>
                     </a:schemeClr>
                   </a:gs>
-                  <a:gs pos="69000">
+                  <a:gs pos="100000">
                     <a:schemeClr val="accent3">
-                      <a:lumMod val="75000"/>
-                    </a:schemeClr>
-                  </a:gs>
-                  <a:gs pos="97000">
-                    <a:schemeClr val="accent3">
-                      <a:lumMod val="70000"/>
+                      <a:lumMod val="60000"/>
+                      <a:lumOff val="40000"/>
                     </a:schemeClr>
                   </a:gs>
                 </a:gsLst>
-                <a:path path="circle">
-                  <a:fillToRect l="50000" t="50000" r="50000" b="50000"/>
-                </a:path>
+                <a:lin ang="16200000" scaled="1"/>
                 <a:tileRect/>
               </a:gradFill>
               <a:ln>
@@ -38307,28 +38282,23 @@
                 <a:gsLst>
                   <a:gs pos="0">
                     <a:schemeClr val="accent2">
-                      <a:lumMod val="89000"/>
+                      <a:lumMod val="67000"/>
                     </a:schemeClr>
                   </a:gs>
-                  <a:gs pos="23000">
+                  <a:gs pos="48000">
                     <a:schemeClr val="accent2">
-                      <a:lumMod val="89000"/>
+                      <a:lumMod val="97000"/>
+                      <a:lumOff val="3000"/>
                     </a:schemeClr>
                   </a:gs>
-                  <a:gs pos="69000">
+                  <a:gs pos="100000">
                     <a:schemeClr val="accent2">
-                      <a:lumMod val="75000"/>
-                    </a:schemeClr>
-                  </a:gs>
-                  <a:gs pos="97000">
-                    <a:schemeClr val="accent2">
-                      <a:lumMod val="70000"/>
+                      <a:lumMod val="60000"/>
+                      <a:lumOff val="40000"/>
                     </a:schemeClr>
                   </a:gs>
                 </a:gsLst>
-                <a:path path="circle">
-                  <a:fillToRect l="50000" t="50000" r="50000" b="50000"/>
-                </a:path>
+                <a:lin ang="16200000" scaled="1"/>
                 <a:tileRect/>
               </a:gradFill>
               <a:ln>
@@ -38386,28 +38356,23 @@
                 <a:gsLst>
                   <a:gs pos="0">
                     <a:schemeClr val="accent3">
-                      <a:lumMod val="89000"/>
+                      <a:lumMod val="67000"/>
                     </a:schemeClr>
                   </a:gs>
-                  <a:gs pos="23000">
+                  <a:gs pos="48000">
                     <a:schemeClr val="accent3">
-                      <a:lumMod val="89000"/>
+                      <a:lumMod val="97000"/>
+                      <a:lumOff val="3000"/>
                     </a:schemeClr>
                   </a:gs>
-                  <a:gs pos="69000">
+                  <a:gs pos="100000">
                     <a:schemeClr val="accent3">
-                      <a:lumMod val="75000"/>
-                    </a:schemeClr>
-                  </a:gs>
-                  <a:gs pos="97000">
-                    <a:schemeClr val="accent3">
-                      <a:lumMod val="70000"/>
+                      <a:lumMod val="60000"/>
+                      <a:lumOff val="40000"/>
                     </a:schemeClr>
                   </a:gs>
                 </a:gsLst>
-                <a:path path="circle">
-                  <a:fillToRect l="50000" t="50000" r="50000" b="50000"/>
-                </a:path>
+                <a:lin ang="16200000" scaled="1"/>
                 <a:tileRect/>
               </a:gradFill>
               <a:ln>
@@ -38465,28 +38430,23 @@
                 <a:gsLst>
                   <a:gs pos="0">
                     <a:schemeClr val="accent2">
-                      <a:lumMod val="89000"/>
+                      <a:lumMod val="67000"/>
                     </a:schemeClr>
                   </a:gs>
-                  <a:gs pos="23000">
+                  <a:gs pos="48000">
                     <a:schemeClr val="accent2">
-                      <a:lumMod val="89000"/>
+                      <a:lumMod val="97000"/>
+                      <a:lumOff val="3000"/>
                     </a:schemeClr>
                   </a:gs>
-                  <a:gs pos="69000">
+                  <a:gs pos="100000">
                     <a:schemeClr val="accent2">
-                      <a:lumMod val="75000"/>
-                    </a:schemeClr>
-                  </a:gs>
-                  <a:gs pos="97000">
-                    <a:schemeClr val="accent2">
-                      <a:lumMod val="70000"/>
+                      <a:lumMod val="60000"/>
+                      <a:lumOff val="40000"/>
                     </a:schemeClr>
                   </a:gs>
                 </a:gsLst>
-                <a:path path="circle">
-                  <a:fillToRect l="50000" t="50000" r="50000" b="50000"/>
-                </a:path>
+                <a:lin ang="16200000" scaled="1"/>
                 <a:tileRect/>
               </a:gradFill>
               <a:ln>
@@ -38544,28 +38504,23 @@
                 <a:gsLst>
                   <a:gs pos="0">
                     <a:schemeClr val="accent3">
-                      <a:lumMod val="89000"/>
+                      <a:lumMod val="67000"/>
                     </a:schemeClr>
                   </a:gs>
-                  <a:gs pos="23000">
+                  <a:gs pos="48000">
                     <a:schemeClr val="accent3">
-                      <a:lumMod val="89000"/>
+                      <a:lumMod val="97000"/>
+                      <a:lumOff val="3000"/>
                     </a:schemeClr>
                   </a:gs>
-                  <a:gs pos="69000">
+                  <a:gs pos="100000">
                     <a:schemeClr val="accent3">
-                      <a:lumMod val="75000"/>
-                    </a:schemeClr>
-                  </a:gs>
-                  <a:gs pos="97000">
-                    <a:schemeClr val="accent3">
-                      <a:lumMod val="70000"/>
+                      <a:lumMod val="60000"/>
+                      <a:lumOff val="40000"/>
                     </a:schemeClr>
                   </a:gs>
                 </a:gsLst>
-                <a:path path="circle">
-                  <a:fillToRect l="50000" t="50000" r="50000" b="50000"/>
-                </a:path>
+                <a:lin ang="16200000" scaled="1"/>
                 <a:tileRect/>
               </a:gradFill>
               <a:ln>
@@ -38688,8 +38643,8 @@
             </p:style>
           </p:cxnSp>
         </p:grpSp>
-        <mc:AlternateContent xmlns:mc="http://schemas.openxmlformats.org/markup-compatibility/2006">
-          <mc:Choice xmlns:a14="http://schemas.microsoft.com/office/drawing/2010/main" Requires="a14">
+        <mc:AlternateContent xmlns:mc="http://schemas.openxmlformats.org/markup-compatibility/2006" xmlns:a14="http://schemas.microsoft.com/office/drawing/2010/main">
+          <mc:Choice Requires="a14">
             <p:sp>
               <p:nvSpPr>
                 <p:cNvPr id="24" name="Rectangle 23">
@@ -38717,6 +38672,7 @@
                 </a:bodyPr>
                 <a:lstStyle/>
                 <a:p>
+                  <a:pPr/>
                   <a14:m>
                     <m:oMathPara xmlns:m="http://schemas.openxmlformats.org/officeDocument/2006/math">
                       <m:oMathParaPr>
@@ -38756,7 +38712,7 @@
               </p:txBody>
             </p:sp>
           </mc:Choice>
-          <mc:Fallback>
+          <mc:Fallback xmlns="">
             <p:sp>
               <p:nvSpPr>
                 <p:cNvPr id="24" name="Rectangle 23">
@@ -38801,8 +38757,8 @@
             </p:sp>
           </mc:Fallback>
         </mc:AlternateContent>
-        <mc:AlternateContent xmlns:mc="http://schemas.openxmlformats.org/markup-compatibility/2006">
-          <mc:Choice xmlns:a14="http://schemas.microsoft.com/office/drawing/2010/main" Requires="a14">
+        <mc:AlternateContent xmlns:mc="http://schemas.openxmlformats.org/markup-compatibility/2006" xmlns:a14="http://schemas.microsoft.com/office/drawing/2010/main">
+          <mc:Choice Requires="a14">
             <p:sp>
               <p:nvSpPr>
                 <p:cNvPr id="52" name="Rectangle 51">
@@ -38830,6 +38786,1586 @@
                 </a:bodyPr>
                 <a:lstStyle/>
                 <a:p>
+                  <a:pPr/>
+                  <a14:m>
+                    <m:oMathPara xmlns:m="http://schemas.openxmlformats.org/officeDocument/2006/math">
+                      <m:oMathParaPr>
+                        <m:jc m:val="centerGroup"/>
+                      </m:oMathParaPr>
+                      <m:oMath xmlns:m="http://schemas.openxmlformats.org/officeDocument/2006/math">
+                        <m:sSub>
+                          <m:sSubPr>
+                            <m:ctrlPr>
+                              <a:rPr lang="en-US" sz="2000" i="1" smtClean="0">
+                                <a:latin typeface="Cambria Math" panose="02040503050406030204" pitchFamily="18" charset="0"/>
+                              </a:rPr>
+                            </m:ctrlPr>
+                          </m:sSubPr>
+                          <m:e>
+                            <m:r>
+                              <a:rPr lang="en-US" sz="2000" b="0" i="1" smtClean="0">
+                                <a:latin typeface="Cambria Math" panose="02040503050406030204" pitchFamily="18" charset="0"/>
+                              </a:rPr>
+                              <m:t>𝛽</m:t>
+                            </m:r>
+                          </m:e>
+                          <m:sub>
+                            <m:r>
+                              <a:rPr lang="en-US" sz="2000" b="0" i="1" smtClean="0">
+                                <a:latin typeface="Cambria Math" panose="02040503050406030204" pitchFamily="18" charset="0"/>
+                              </a:rPr>
+                              <m:t>2</m:t>
+                            </m:r>
+                          </m:sub>
+                        </m:sSub>
+                      </m:oMath>
+                    </m:oMathPara>
+                  </a14:m>
+                  <a:endParaRPr lang="en-US" sz="2000" dirty="0"/>
+                </a:p>
+              </p:txBody>
+            </p:sp>
+          </mc:Choice>
+          <mc:Fallback xmlns="">
+            <p:sp>
+              <p:nvSpPr>
+                <p:cNvPr id="52" name="Rectangle 51">
+                  <a:extLst>
+                    <a:ext uri="{FF2B5EF4-FFF2-40B4-BE49-F238E27FC236}">
+                      <a16:creationId xmlns:a16="http://schemas.microsoft.com/office/drawing/2014/main" id="{727F33BF-F7AE-4E5B-9920-A6A6CCB6335A}"/>
+                    </a:ext>
+                  </a:extLst>
+                </p:cNvPr>
+                <p:cNvSpPr>
+                  <a:spLocks noRot="1" noChangeAspect="1" noMove="1" noResize="1" noEditPoints="1" noAdjustHandles="1" noChangeArrowheads="1" noChangeShapeType="1" noTextEdit="1"/>
+                </p:cNvSpPr>
+                <p:nvPr/>
+              </p:nvSpPr>
+              <p:spPr>
+                <a:xfrm>
+                  <a:off x="8220469" y="16212020"/>
+                  <a:ext cx="514050" cy="400110"/>
+                </a:xfrm>
+                <a:prstGeom prst="rect">
+                  <a:avLst/>
+                </a:prstGeom>
+                <a:blipFill>
+                  <a:blip r:embed="rId3"/>
+                  <a:stretch>
+                    <a:fillRect b="-16667"/>
+                  </a:stretch>
+                </a:blipFill>
+              </p:spPr>
+              <p:txBody>
+                <a:bodyPr/>
+                <a:lstStyle/>
+                <a:p>
+                  <a:r>
+                    <a:rPr lang="en-US">
+                      <a:noFill/>
+                    </a:rPr>
+                    <a:t> </a:t>
+                  </a:r>
+                </a:p>
+              </p:txBody>
+            </p:sp>
+          </mc:Fallback>
+        </mc:AlternateContent>
+      </p:grpSp>
+      <p:grpSp>
+        <p:nvGrpSpPr>
+          <p:cNvPr id="50" name="Group 49">
+            <a:extLst>
+              <a:ext uri="{FF2B5EF4-FFF2-40B4-BE49-F238E27FC236}">
+                <a16:creationId xmlns:a16="http://schemas.microsoft.com/office/drawing/2014/main" id="{BDC8C86A-26E7-4D12-B26A-533A3433B0EB}"/>
+              </a:ext>
+            </a:extLst>
+          </p:cNvPr>
+          <p:cNvGrpSpPr/>
+          <p:nvPr/>
+        </p:nvGrpSpPr>
+        <p:grpSpPr>
+          <a:xfrm>
+            <a:off x="7388281" y="13652527"/>
+            <a:ext cx="3153460" cy="3110563"/>
+            <a:chOff x="12392351" y="14582830"/>
+            <a:chExt cx="3153460" cy="3110563"/>
+          </a:xfrm>
+        </p:grpSpPr>
+        <p:grpSp>
+          <p:nvGrpSpPr>
+            <p:cNvPr id="54" name="Group 53">
+              <a:extLst>
+                <a:ext uri="{FF2B5EF4-FFF2-40B4-BE49-F238E27FC236}">
+                  <a16:creationId xmlns:a16="http://schemas.microsoft.com/office/drawing/2014/main" id="{65C4E1ED-B550-4DC0-9418-BAA1A4293973}"/>
+                </a:ext>
+              </a:extLst>
+            </p:cNvPr>
+            <p:cNvGrpSpPr/>
+            <p:nvPr/>
+          </p:nvGrpSpPr>
+          <p:grpSpPr>
+            <a:xfrm>
+              <a:off x="12540682" y="14582830"/>
+              <a:ext cx="3005129" cy="3110563"/>
+              <a:chOff x="12540682" y="14582830"/>
+              <a:chExt cx="3005129" cy="3110563"/>
+            </a:xfrm>
+          </p:grpSpPr>
+          <p:sp>
+            <p:nvSpPr>
+              <p:cNvPr id="55" name="Isosceles Triangle 54">
+                <a:extLst>
+                  <a:ext uri="{FF2B5EF4-FFF2-40B4-BE49-F238E27FC236}">
+                    <a16:creationId xmlns:a16="http://schemas.microsoft.com/office/drawing/2014/main" id="{6FA70F2A-E323-48DE-B23C-A021115EBC90}"/>
+                  </a:ext>
+                </a:extLst>
+              </p:cNvPr>
+              <p:cNvSpPr/>
+              <p:nvPr/>
+            </p:nvSpPr>
+            <p:spPr>
+              <a:xfrm rot="9101610">
+                <a:off x="13801637" y="16611938"/>
+                <a:ext cx="1744174" cy="469141"/>
+              </a:xfrm>
+              <a:prstGeom prst="triangle">
+                <a:avLst>
+                  <a:gd name="adj" fmla="val 35610"/>
+                </a:avLst>
+              </a:prstGeom>
+              <a:solidFill>
+                <a:schemeClr val="accent1">
+                  <a:alpha val="52000"/>
+                </a:schemeClr>
+              </a:solidFill>
+              <a:ln>
+                <a:noFill/>
+              </a:ln>
+            </p:spPr>
+            <p:style>
+              <a:lnRef idx="2">
+                <a:schemeClr val="accent1">
+                  <a:shade val="50000"/>
+                </a:schemeClr>
+              </a:lnRef>
+              <a:fillRef idx="1">
+                <a:schemeClr val="accent1"/>
+              </a:fillRef>
+              <a:effectRef idx="0">
+                <a:schemeClr val="accent1"/>
+              </a:effectRef>
+              <a:fontRef idx="minor">
+                <a:schemeClr val="lt1"/>
+              </a:fontRef>
+            </p:style>
+            <p:txBody>
+              <a:bodyPr rtlCol="0" anchor="ctr"/>
+              <a:lstStyle/>
+              <a:p>
+                <a:pPr algn="ctr"/>
+                <a:endParaRPr lang="en-US"/>
+              </a:p>
+            </p:txBody>
+          </p:sp>
+          <p:sp>
+            <p:nvSpPr>
+              <p:cNvPr id="58" name="Isosceles Triangle 57">
+                <a:extLst>
+                  <a:ext uri="{FF2B5EF4-FFF2-40B4-BE49-F238E27FC236}">
+                    <a16:creationId xmlns:a16="http://schemas.microsoft.com/office/drawing/2014/main" id="{FCEFFB96-77DF-4264-9FC1-9F41CC6AFD19}"/>
+                  </a:ext>
+                </a:extLst>
+              </p:cNvPr>
+              <p:cNvSpPr/>
+              <p:nvPr/>
+            </p:nvSpPr>
+            <p:spPr>
+              <a:xfrm rot="13285324">
+                <a:off x="13783957" y="15669310"/>
+                <a:ext cx="1519302" cy="644647"/>
+              </a:xfrm>
+              <a:prstGeom prst="triangle">
+                <a:avLst>
+                  <a:gd name="adj" fmla="val 55199"/>
+                </a:avLst>
+              </a:prstGeom>
+              <a:solidFill>
+                <a:schemeClr val="accent1">
+                  <a:alpha val="52000"/>
+                </a:schemeClr>
+              </a:solidFill>
+              <a:ln>
+                <a:noFill/>
+              </a:ln>
+            </p:spPr>
+            <p:style>
+              <a:lnRef idx="2">
+                <a:schemeClr val="accent1">
+                  <a:shade val="50000"/>
+                </a:schemeClr>
+              </a:lnRef>
+              <a:fillRef idx="1">
+                <a:schemeClr val="accent1"/>
+              </a:fillRef>
+              <a:effectRef idx="0">
+                <a:schemeClr val="accent1"/>
+              </a:effectRef>
+              <a:fontRef idx="minor">
+                <a:schemeClr val="lt1"/>
+              </a:fontRef>
+            </p:style>
+            <p:txBody>
+              <a:bodyPr rtlCol="0" anchor="ctr"/>
+              <a:lstStyle/>
+              <a:p>
+                <a:pPr algn="ctr"/>
+                <a:endParaRPr lang="en-US"/>
+              </a:p>
+            </p:txBody>
+          </p:sp>
+          <p:sp>
+            <p:nvSpPr>
+              <p:cNvPr id="59" name="Isosceles Triangle 58">
+                <a:extLst>
+                  <a:ext uri="{FF2B5EF4-FFF2-40B4-BE49-F238E27FC236}">
+                    <a16:creationId xmlns:a16="http://schemas.microsoft.com/office/drawing/2014/main" id="{F0560D28-1C39-4F83-B9DA-20EB66E308A1}"/>
+                  </a:ext>
+                </a:extLst>
+              </p:cNvPr>
+              <p:cNvSpPr/>
+              <p:nvPr/>
+            </p:nvSpPr>
+            <p:spPr>
+              <a:xfrm rot="19976415">
+                <a:off x="12763265" y="15508178"/>
+                <a:ext cx="1294172" cy="1037059"/>
+              </a:xfrm>
+              <a:prstGeom prst="triangle">
+                <a:avLst>
+                  <a:gd name="adj" fmla="val 20014"/>
+                </a:avLst>
+              </a:prstGeom>
+              <a:solidFill>
+                <a:schemeClr val="accent1">
+                  <a:alpha val="52000"/>
+                </a:schemeClr>
+              </a:solidFill>
+              <a:ln>
+                <a:noFill/>
+              </a:ln>
+            </p:spPr>
+            <p:style>
+              <a:lnRef idx="2">
+                <a:schemeClr val="accent1">
+                  <a:shade val="50000"/>
+                </a:schemeClr>
+              </a:lnRef>
+              <a:fillRef idx="1">
+                <a:schemeClr val="accent1"/>
+              </a:fillRef>
+              <a:effectRef idx="0">
+                <a:schemeClr val="accent1"/>
+              </a:effectRef>
+              <a:fontRef idx="minor">
+                <a:schemeClr val="lt1"/>
+              </a:fontRef>
+            </p:style>
+            <p:txBody>
+              <a:bodyPr rtlCol="0" anchor="ctr"/>
+              <a:lstStyle/>
+              <a:p>
+                <a:pPr algn="ctr"/>
+                <a:endParaRPr lang="en-US"/>
+              </a:p>
+            </p:txBody>
+          </p:sp>
+          <p:cxnSp>
+            <p:nvCxnSpPr>
+              <p:cNvPr id="60" name="Straight Connector 59">
+                <a:extLst>
+                  <a:ext uri="{FF2B5EF4-FFF2-40B4-BE49-F238E27FC236}">
+                    <a16:creationId xmlns:a16="http://schemas.microsoft.com/office/drawing/2014/main" id="{D3AF5021-0202-4153-B8C9-2B4981546789}"/>
+                  </a:ext>
+                </a:extLst>
+              </p:cNvPr>
+              <p:cNvCxnSpPr>
+                <a:cxnSpLocks/>
+              </p:cNvCxnSpPr>
+              <p:nvPr/>
+            </p:nvCxnSpPr>
+            <p:spPr>
+              <a:xfrm flipH="1" flipV="1">
+                <a:off x="13653339" y="14770473"/>
+                <a:ext cx="558935" cy="525282"/>
+              </a:xfrm>
+              <a:prstGeom prst="line">
+                <a:avLst/>
+              </a:prstGeom>
+              <a:ln w="38100">
+                <a:solidFill>
+                  <a:schemeClr val="tx1"/>
+                </a:solidFill>
+              </a:ln>
+            </p:spPr>
+            <p:style>
+              <a:lnRef idx="1">
+                <a:schemeClr val="accent1"/>
+              </a:lnRef>
+              <a:fillRef idx="0">
+                <a:schemeClr val="accent1"/>
+              </a:fillRef>
+              <a:effectRef idx="0">
+                <a:schemeClr val="accent1"/>
+              </a:effectRef>
+              <a:fontRef idx="minor">
+                <a:schemeClr val="tx1"/>
+              </a:fontRef>
+            </p:style>
+          </p:cxnSp>
+          <p:cxnSp>
+            <p:nvCxnSpPr>
+              <p:cNvPr id="61" name="Straight Connector 60">
+                <a:extLst>
+                  <a:ext uri="{FF2B5EF4-FFF2-40B4-BE49-F238E27FC236}">
+                    <a16:creationId xmlns:a16="http://schemas.microsoft.com/office/drawing/2014/main" id="{D9A8D489-0AB0-4E6A-A9E2-D6825313B45D}"/>
+                  </a:ext>
+                </a:extLst>
+              </p:cNvPr>
+              <p:cNvCxnSpPr>
+                <a:cxnSpLocks/>
+              </p:cNvCxnSpPr>
+              <p:nvPr/>
+            </p:nvCxnSpPr>
+            <p:spPr>
+              <a:xfrm flipH="1">
+                <a:off x="12723066" y="16761215"/>
+                <a:ext cx="367605" cy="778554"/>
+              </a:xfrm>
+              <a:prstGeom prst="line">
+                <a:avLst/>
+              </a:prstGeom>
+              <a:ln w="38100">
+                <a:solidFill>
+                  <a:schemeClr val="tx1"/>
+                </a:solidFill>
+              </a:ln>
+            </p:spPr>
+            <p:style>
+              <a:lnRef idx="1">
+                <a:schemeClr val="accent1"/>
+              </a:lnRef>
+              <a:fillRef idx="0">
+                <a:schemeClr val="accent1"/>
+              </a:fillRef>
+              <a:effectRef idx="0">
+                <a:schemeClr val="accent1"/>
+              </a:effectRef>
+              <a:fontRef idx="minor">
+                <a:schemeClr val="tx1"/>
+              </a:fontRef>
+            </p:style>
+          </p:cxnSp>
+          <p:cxnSp>
+            <p:nvCxnSpPr>
+              <p:cNvPr id="62" name="Straight Connector 61">
+                <a:extLst>
+                  <a:ext uri="{FF2B5EF4-FFF2-40B4-BE49-F238E27FC236}">
+                    <a16:creationId xmlns:a16="http://schemas.microsoft.com/office/drawing/2014/main" id="{944DDFD4-0572-45CC-BDA9-F9143FEDC06E}"/>
+                  </a:ext>
+                </a:extLst>
+              </p:cNvPr>
+              <p:cNvCxnSpPr>
+                <a:cxnSpLocks/>
+              </p:cNvCxnSpPr>
+              <p:nvPr/>
+            </p:nvCxnSpPr>
+            <p:spPr>
+              <a:xfrm flipH="1" flipV="1">
+                <a:off x="14236880" y="16177463"/>
+                <a:ext cx="1046512" cy="57043"/>
+              </a:xfrm>
+              <a:prstGeom prst="line">
+                <a:avLst/>
+              </a:prstGeom>
+              <a:ln w="38100">
+                <a:solidFill>
+                  <a:schemeClr val="tx1"/>
+                </a:solidFill>
+              </a:ln>
+            </p:spPr>
+            <p:style>
+              <a:lnRef idx="1">
+                <a:schemeClr val="accent1"/>
+              </a:lnRef>
+              <a:fillRef idx="0">
+                <a:schemeClr val="accent1"/>
+              </a:fillRef>
+              <a:effectRef idx="0">
+                <a:schemeClr val="accent1"/>
+              </a:effectRef>
+              <a:fontRef idx="minor">
+                <a:schemeClr val="tx1"/>
+              </a:fontRef>
+            </p:style>
+          </p:cxnSp>
+          <p:cxnSp>
+            <p:nvCxnSpPr>
+              <p:cNvPr id="63" name="Straight Connector 62">
+                <a:extLst>
+                  <a:ext uri="{FF2B5EF4-FFF2-40B4-BE49-F238E27FC236}">
+                    <a16:creationId xmlns:a16="http://schemas.microsoft.com/office/drawing/2014/main" id="{5262AFC3-8FA7-4A80-AD59-7078A00B862D}"/>
+                  </a:ext>
+                </a:extLst>
+              </p:cNvPr>
+              <p:cNvCxnSpPr>
+                <a:cxnSpLocks/>
+              </p:cNvCxnSpPr>
+              <p:nvPr/>
+            </p:nvCxnSpPr>
+            <p:spPr>
+              <a:xfrm flipH="1" flipV="1">
+                <a:off x="14238763" y="16165476"/>
+                <a:ext cx="754315" cy="764465"/>
+              </a:xfrm>
+              <a:prstGeom prst="line">
+                <a:avLst/>
+              </a:prstGeom>
+              <a:ln w="38100">
+                <a:solidFill>
+                  <a:schemeClr val="tx1"/>
+                </a:solidFill>
+              </a:ln>
+            </p:spPr>
+            <p:style>
+              <a:lnRef idx="1">
+                <a:schemeClr val="accent1"/>
+              </a:lnRef>
+              <a:fillRef idx="0">
+                <a:schemeClr val="accent1"/>
+              </a:fillRef>
+              <a:effectRef idx="0">
+                <a:schemeClr val="accent1"/>
+              </a:effectRef>
+              <a:fontRef idx="minor">
+                <a:schemeClr val="tx1"/>
+              </a:fontRef>
+            </p:style>
+          </p:cxnSp>
+          <p:cxnSp>
+            <p:nvCxnSpPr>
+              <p:cNvPr id="64" name="Straight Connector 63">
+                <a:extLst>
+                  <a:ext uri="{FF2B5EF4-FFF2-40B4-BE49-F238E27FC236}">
+                    <a16:creationId xmlns:a16="http://schemas.microsoft.com/office/drawing/2014/main" id="{4C20AC8E-DB1F-4689-B2DA-4A135D3B0894}"/>
+                  </a:ext>
+                </a:extLst>
+              </p:cNvPr>
+              <p:cNvCxnSpPr>
+                <a:cxnSpLocks/>
+              </p:cNvCxnSpPr>
+              <p:nvPr/>
+            </p:nvCxnSpPr>
+            <p:spPr>
+              <a:xfrm flipH="1" flipV="1">
+                <a:off x="12813699" y="15753692"/>
+                <a:ext cx="1457945" cy="444421"/>
+              </a:xfrm>
+              <a:prstGeom prst="line">
+                <a:avLst/>
+              </a:prstGeom>
+              <a:ln w="38100">
+                <a:solidFill>
+                  <a:schemeClr val="tx1"/>
+                </a:solidFill>
+              </a:ln>
+            </p:spPr>
+            <p:style>
+              <a:lnRef idx="1">
+                <a:schemeClr val="accent1"/>
+              </a:lnRef>
+              <a:fillRef idx="0">
+                <a:schemeClr val="accent1"/>
+              </a:fillRef>
+              <a:effectRef idx="0">
+                <a:schemeClr val="accent1"/>
+              </a:effectRef>
+              <a:fontRef idx="minor">
+                <a:schemeClr val="tx1"/>
+              </a:fontRef>
+            </p:style>
+          </p:cxnSp>
+          <p:cxnSp>
+            <p:nvCxnSpPr>
+              <p:cNvPr id="65" name="Straight Connector 64">
+                <a:extLst>
+                  <a:ext uri="{FF2B5EF4-FFF2-40B4-BE49-F238E27FC236}">
+                    <a16:creationId xmlns:a16="http://schemas.microsoft.com/office/drawing/2014/main" id="{274BCEAE-0FAA-44C4-AACC-382C6C39EEC7}"/>
+                  </a:ext>
+                </a:extLst>
+              </p:cNvPr>
+              <p:cNvCxnSpPr>
+                <a:cxnSpLocks/>
+              </p:cNvCxnSpPr>
+              <p:nvPr/>
+            </p:nvCxnSpPr>
+            <p:spPr>
+              <a:xfrm>
+                <a:off x="14194637" y="15276482"/>
+                <a:ext cx="76204" cy="900980"/>
+              </a:xfrm>
+              <a:prstGeom prst="line">
+                <a:avLst/>
+              </a:prstGeom>
+              <a:ln w="38100">
+                <a:solidFill>
+                  <a:schemeClr val="tx1"/>
+                </a:solidFill>
+              </a:ln>
+            </p:spPr>
+            <p:style>
+              <a:lnRef idx="1">
+                <a:schemeClr val="accent1"/>
+              </a:lnRef>
+              <a:fillRef idx="0">
+                <a:schemeClr val="accent1"/>
+              </a:fillRef>
+              <a:effectRef idx="0">
+                <a:schemeClr val="accent1"/>
+              </a:effectRef>
+              <a:fontRef idx="minor">
+                <a:schemeClr val="tx1"/>
+              </a:fontRef>
+            </p:style>
+          </p:cxnSp>
+          <p:cxnSp>
+            <p:nvCxnSpPr>
+              <p:cNvPr id="66" name="Straight Connector 65">
+                <a:extLst>
+                  <a:ext uri="{FF2B5EF4-FFF2-40B4-BE49-F238E27FC236}">
+                    <a16:creationId xmlns:a16="http://schemas.microsoft.com/office/drawing/2014/main" id="{F7055529-9DE7-47A0-9EAD-7A5BC5F0CF8E}"/>
+                  </a:ext>
+                </a:extLst>
+              </p:cNvPr>
+              <p:cNvCxnSpPr>
+                <a:cxnSpLocks/>
+              </p:cNvCxnSpPr>
+              <p:nvPr/>
+            </p:nvCxnSpPr>
+            <p:spPr>
+              <a:xfrm flipH="1" flipV="1">
+                <a:off x="13078881" y="16771908"/>
+                <a:ext cx="737609" cy="293476"/>
+              </a:xfrm>
+              <a:prstGeom prst="line">
+                <a:avLst/>
+              </a:prstGeom>
+              <a:ln w="38100">
+                <a:solidFill>
+                  <a:schemeClr val="tx1"/>
+                </a:solidFill>
+              </a:ln>
+            </p:spPr>
+            <p:style>
+              <a:lnRef idx="1">
+                <a:schemeClr val="accent1"/>
+              </a:lnRef>
+              <a:fillRef idx="0">
+                <a:schemeClr val="accent1"/>
+              </a:fillRef>
+              <a:effectRef idx="0">
+                <a:schemeClr val="accent1"/>
+              </a:effectRef>
+              <a:fontRef idx="minor">
+                <a:schemeClr val="tx1"/>
+              </a:fontRef>
+            </p:style>
+          </p:cxnSp>
+          <p:cxnSp>
+            <p:nvCxnSpPr>
+              <p:cNvPr id="67" name="Straight Connector 66">
+                <a:extLst>
+                  <a:ext uri="{FF2B5EF4-FFF2-40B4-BE49-F238E27FC236}">
+                    <a16:creationId xmlns:a16="http://schemas.microsoft.com/office/drawing/2014/main" id="{A00955E4-BA24-41CC-AD74-76823AF306FA}"/>
+                  </a:ext>
+                </a:extLst>
+              </p:cNvPr>
+              <p:cNvCxnSpPr>
+                <a:cxnSpLocks/>
+              </p:cNvCxnSpPr>
+              <p:nvPr/>
+            </p:nvCxnSpPr>
+            <p:spPr>
+              <a:xfrm>
+                <a:off x="12843416" y="15753691"/>
+                <a:ext cx="236084" cy="1018217"/>
+              </a:xfrm>
+              <a:prstGeom prst="line">
+                <a:avLst/>
+              </a:prstGeom>
+              <a:ln w="38100">
+                <a:solidFill>
+                  <a:schemeClr val="tx1"/>
+                </a:solidFill>
+              </a:ln>
+            </p:spPr>
+            <p:style>
+              <a:lnRef idx="1">
+                <a:schemeClr val="accent1"/>
+              </a:lnRef>
+              <a:fillRef idx="0">
+                <a:schemeClr val="accent1"/>
+              </a:fillRef>
+              <a:effectRef idx="0">
+                <a:schemeClr val="accent1"/>
+              </a:effectRef>
+              <a:fontRef idx="minor">
+                <a:schemeClr val="tx1"/>
+              </a:fontRef>
+            </p:style>
+          </p:cxnSp>
+          <p:cxnSp>
+            <p:nvCxnSpPr>
+              <p:cNvPr id="68" name="Straight Connector 67">
+                <a:extLst>
+                  <a:ext uri="{FF2B5EF4-FFF2-40B4-BE49-F238E27FC236}">
+                    <a16:creationId xmlns:a16="http://schemas.microsoft.com/office/drawing/2014/main" id="{EC8549DC-E118-4DF6-9EFB-7ECAF1B42EE0}"/>
+                  </a:ext>
+                </a:extLst>
+              </p:cNvPr>
+              <p:cNvCxnSpPr>
+                <a:cxnSpLocks/>
+              </p:cNvCxnSpPr>
+              <p:nvPr/>
+            </p:nvCxnSpPr>
+            <p:spPr>
+              <a:xfrm flipH="1">
+                <a:off x="13079502" y="16198113"/>
+                <a:ext cx="1157377" cy="573794"/>
+              </a:xfrm>
+              <a:prstGeom prst="line">
+                <a:avLst/>
+              </a:prstGeom>
+              <a:ln w="38100">
+                <a:solidFill>
+                  <a:schemeClr val="tx1"/>
+                </a:solidFill>
+              </a:ln>
+            </p:spPr>
+            <p:style>
+              <a:lnRef idx="1">
+                <a:schemeClr val="accent1"/>
+              </a:lnRef>
+              <a:fillRef idx="0">
+                <a:schemeClr val="accent1"/>
+              </a:fillRef>
+              <a:effectRef idx="0">
+                <a:schemeClr val="accent1"/>
+              </a:effectRef>
+              <a:fontRef idx="minor">
+                <a:schemeClr val="tx1"/>
+              </a:fontRef>
+            </p:style>
+          </p:cxnSp>
+          <p:sp>
+            <p:nvSpPr>
+              <p:cNvPr id="69" name="Oval 68">
+                <a:extLst>
+                  <a:ext uri="{FF2B5EF4-FFF2-40B4-BE49-F238E27FC236}">
+                    <a16:creationId xmlns:a16="http://schemas.microsoft.com/office/drawing/2014/main" id="{C2B9A2FB-EC3A-4942-8963-1A19055AEAD3}"/>
+                  </a:ext>
+                </a:extLst>
+              </p:cNvPr>
+              <p:cNvSpPr/>
+              <p:nvPr/>
+            </p:nvSpPr>
+            <p:spPr>
+              <a:xfrm>
+                <a:off x="12654153" y="15571307"/>
+                <a:ext cx="364768" cy="364768"/>
+              </a:xfrm>
+              <a:prstGeom prst="ellipse">
+                <a:avLst/>
+              </a:prstGeom>
+              <a:gradFill flip="none" rotWithShape="1">
+                <a:gsLst>
+                  <a:gs pos="0">
+                    <a:schemeClr val="accent2">
+                      <a:lumMod val="67000"/>
+                    </a:schemeClr>
+                  </a:gs>
+                  <a:gs pos="48000">
+                    <a:schemeClr val="accent2">
+                      <a:lumMod val="97000"/>
+                      <a:lumOff val="3000"/>
+                    </a:schemeClr>
+                  </a:gs>
+                  <a:gs pos="100000">
+                    <a:schemeClr val="accent2">
+                      <a:lumMod val="60000"/>
+                      <a:lumOff val="40000"/>
+                    </a:schemeClr>
+                  </a:gs>
+                </a:gsLst>
+                <a:lin ang="16200000" scaled="1"/>
+                <a:tileRect/>
+              </a:gradFill>
+              <a:ln>
+                <a:solidFill>
+                  <a:schemeClr val="tx1"/>
+                </a:solidFill>
+              </a:ln>
+            </p:spPr>
+            <p:style>
+              <a:lnRef idx="2">
+                <a:schemeClr val="accent1">
+                  <a:shade val="50000"/>
+                </a:schemeClr>
+              </a:lnRef>
+              <a:fillRef idx="1">
+                <a:schemeClr val="accent1"/>
+              </a:fillRef>
+              <a:effectRef idx="0">
+                <a:schemeClr val="accent1"/>
+              </a:effectRef>
+              <a:fontRef idx="minor">
+                <a:schemeClr val="lt1"/>
+              </a:fontRef>
+            </p:style>
+            <p:txBody>
+              <a:bodyPr rtlCol="0" anchor="ctr"/>
+              <a:lstStyle/>
+              <a:p>
+                <a:pPr algn="ctr"/>
+                <a:endParaRPr lang="en-US"/>
+              </a:p>
+            </p:txBody>
+          </p:sp>
+          <p:sp>
+            <p:nvSpPr>
+              <p:cNvPr id="70" name="Oval 69">
+                <a:extLst>
+                  <a:ext uri="{FF2B5EF4-FFF2-40B4-BE49-F238E27FC236}">
+                    <a16:creationId xmlns:a16="http://schemas.microsoft.com/office/drawing/2014/main" id="{1D6E56B2-0BBB-49E1-8226-C8B5CA723BD6}"/>
+                  </a:ext>
+                </a:extLst>
+              </p:cNvPr>
+              <p:cNvSpPr/>
+              <p:nvPr/>
+            </p:nvSpPr>
+            <p:spPr>
+              <a:xfrm>
+                <a:off x="14075071" y="15992527"/>
+                <a:ext cx="364768" cy="364768"/>
+              </a:xfrm>
+              <a:prstGeom prst="ellipse">
+                <a:avLst/>
+              </a:prstGeom>
+              <a:gradFill flip="none" rotWithShape="1">
+                <a:gsLst>
+                  <a:gs pos="0">
+                    <a:schemeClr val="accent2">
+                      <a:lumMod val="67000"/>
+                    </a:schemeClr>
+                  </a:gs>
+                  <a:gs pos="48000">
+                    <a:schemeClr val="accent2">
+                      <a:lumMod val="97000"/>
+                      <a:lumOff val="3000"/>
+                    </a:schemeClr>
+                  </a:gs>
+                  <a:gs pos="100000">
+                    <a:schemeClr val="accent2">
+                      <a:lumMod val="60000"/>
+                      <a:lumOff val="40000"/>
+                    </a:schemeClr>
+                  </a:gs>
+                </a:gsLst>
+                <a:lin ang="16200000" scaled="1"/>
+                <a:tileRect/>
+              </a:gradFill>
+              <a:ln>
+                <a:solidFill>
+                  <a:schemeClr val="tx1"/>
+                </a:solidFill>
+              </a:ln>
+            </p:spPr>
+            <p:style>
+              <a:lnRef idx="2">
+                <a:schemeClr val="accent1">
+                  <a:shade val="50000"/>
+                </a:schemeClr>
+              </a:lnRef>
+              <a:fillRef idx="1">
+                <a:schemeClr val="accent1"/>
+              </a:fillRef>
+              <a:effectRef idx="0">
+                <a:schemeClr val="accent1"/>
+              </a:effectRef>
+              <a:fontRef idx="minor">
+                <a:schemeClr val="lt1"/>
+              </a:fontRef>
+            </p:style>
+            <p:txBody>
+              <a:bodyPr rtlCol="0" anchor="ctr"/>
+              <a:lstStyle/>
+              <a:p>
+                <a:pPr algn="ctr"/>
+                <a:endParaRPr lang="en-US"/>
+              </a:p>
+            </p:txBody>
+          </p:sp>
+          <p:sp>
+            <p:nvSpPr>
+              <p:cNvPr id="71" name="Oval 70">
+                <a:extLst>
+                  <a:ext uri="{FF2B5EF4-FFF2-40B4-BE49-F238E27FC236}">
+                    <a16:creationId xmlns:a16="http://schemas.microsoft.com/office/drawing/2014/main" id="{C10A1E6B-BBC2-468D-A119-7ECF4493FF25}"/>
+                  </a:ext>
+                </a:extLst>
+              </p:cNvPr>
+              <p:cNvSpPr/>
+              <p:nvPr/>
+            </p:nvSpPr>
+            <p:spPr>
+              <a:xfrm>
+                <a:off x="12897117" y="16578831"/>
+                <a:ext cx="364768" cy="364768"/>
+              </a:xfrm>
+              <a:prstGeom prst="ellipse">
+                <a:avLst/>
+              </a:prstGeom>
+              <a:gradFill>
+                <a:gsLst>
+                  <a:gs pos="0">
+                    <a:schemeClr val="bg1"/>
+                  </a:gs>
+                  <a:gs pos="74000">
+                    <a:schemeClr val="bg1">
+                      <a:lumMod val="65000"/>
+                    </a:schemeClr>
+                  </a:gs>
+                  <a:gs pos="83000">
+                    <a:schemeClr val="bg1">
+                      <a:lumMod val="75000"/>
+                    </a:schemeClr>
+                  </a:gs>
+                  <a:gs pos="100000">
+                    <a:schemeClr val="bg1">
+                      <a:lumMod val="85000"/>
+                    </a:schemeClr>
+                  </a:gs>
+                </a:gsLst>
+                <a:lin ang="5400000" scaled="1"/>
+              </a:gradFill>
+              <a:ln>
+                <a:solidFill>
+                  <a:schemeClr val="tx1"/>
+                </a:solidFill>
+              </a:ln>
+            </p:spPr>
+            <p:style>
+              <a:lnRef idx="2">
+                <a:schemeClr val="accent1">
+                  <a:shade val="50000"/>
+                </a:schemeClr>
+              </a:lnRef>
+              <a:fillRef idx="1">
+                <a:schemeClr val="accent1"/>
+              </a:fillRef>
+              <a:effectRef idx="0">
+                <a:schemeClr val="accent1"/>
+              </a:effectRef>
+              <a:fontRef idx="minor">
+                <a:schemeClr val="lt1"/>
+              </a:fontRef>
+            </p:style>
+            <p:txBody>
+              <a:bodyPr rtlCol="0" anchor="ctr"/>
+              <a:lstStyle/>
+              <a:p>
+                <a:pPr algn="ctr"/>
+                <a:endParaRPr lang="en-US"/>
+              </a:p>
+            </p:txBody>
+          </p:sp>
+          <p:sp>
+            <p:nvSpPr>
+              <p:cNvPr id="72" name="Oval 71">
+                <a:extLst>
+                  <a:ext uri="{FF2B5EF4-FFF2-40B4-BE49-F238E27FC236}">
+                    <a16:creationId xmlns:a16="http://schemas.microsoft.com/office/drawing/2014/main" id="{4F9DD611-F461-43E3-9284-AB9E316B3B77}"/>
+                  </a:ext>
+                </a:extLst>
+              </p:cNvPr>
+              <p:cNvSpPr/>
+              <p:nvPr/>
+            </p:nvSpPr>
+            <p:spPr>
+              <a:xfrm>
+                <a:off x="14020733" y="15077069"/>
+                <a:ext cx="364768" cy="364768"/>
+              </a:xfrm>
+              <a:prstGeom prst="ellipse">
+                <a:avLst/>
+              </a:prstGeom>
+              <a:gradFill flip="none" rotWithShape="1">
+                <a:gsLst>
+                  <a:gs pos="0">
+                    <a:schemeClr val="accent2">
+                      <a:lumMod val="67000"/>
+                    </a:schemeClr>
+                  </a:gs>
+                  <a:gs pos="48000">
+                    <a:schemeClr val="accent2">
+                      <a:lumMod val="97000"/>
+                      <a:lumOff val="3000"/>
+                    </a:schemeClr>
+                  </a:gs>
+                  <a:gs pos="100000">
+                    <a:schemeClr val="accent2">
+                      <a:lumMod val="60000"/>
+                      <a:lumOff val="40000"/>
+                    </a:schemeClr>
+                  </a:gs>
+                </a:gsLst>
+                <a:lin ang="16200000" scaled="1"/>
+                <a:tileRect/>
+              </a:gradFill>
+              <a:ln>
+                <a:solidFill>
+                  <a:schemeClr val="tx1"/>
+                </a:solidFill>
+              </a:ln>
+            </p:spPr>
+            <p:style>
+              <a:lnRef idx="2">
+                <a:schemeClr val="accent1">
+                  <a:shade val="50000"/>
+                </a:schemeClr>
+              </a:lnRef>
+              <a:fillRef idx="1">
+                <a:schemeClr val="accent1"/>
+              </a:fillRef>
+              <a:effectRef idx="0">
+                <a:schemeClr val="accent1"/>
+              </a:effectRef>
+              <a:fontRef idx="minor">
+                <a:schemeClr val="lt1"/>
+              </a:fontRef>
+            </p:style>
+            <p:txBody>
+              <a:bodyPr rtlCol="0" anchor="ctr"/>
+              <a:lstStyle/>
+              <a:p>
+                <a:pPr algn="ctr"/>
+                <a:endParaRPr lang="en-US"/>
+              </a:p>
+            </p:txBody>
+          </p:sp>
+          <p:sp>
+            <p:nvSpPr>
+              <p:cNvPr id="73" name="Oval 72">
+                <a:extLst>
+                  <a:ext uri="{FF2B5EF4-FFF2-40B4-BE49-F238E27FC236}">
+                    <a16:creationId xmlns:a16="http://schemas.microsoft.com/office/drawing/2014/main" id="{F00DC13C-91DB-4C41-A805-62AFDAEE6284}"/>
+                  </a:ext>
+                </a:extLst>
+              </p:cNvPr>
+              <p:cNvSpPr/>
+              <p:nvPr/>
+            </p:nvSpPr>
+            <p:spPr>
+              <a:xfrm>
+                <a:off x="13634106" y="16874854"/>
+                <a:ext cx="364768" cy="364768"/>
+              </a:xfrm>
+              <a:prstGeom prst="ellipse">
+                <a:avLst/>
+              </a:prstGeom>
+              <a:gradFill>
+                <a:gsLst>
+                  <a:gs pos="0">
+                    <a:schemeClr val="bg1"/>
+                  </a:gs>
+                  <a:gs pos="74000">
+                    <a:schemeClr val="bg1">
+                      <a:lumMod val="65000"/>
+                    </a:schemeClr>
+                  </a:gs>
+                  <a:gs pos="83000">
+                    <a:schemeClr val="bg1">
+                      <a:lumMod val="75000"/>
+                    </a:schemeClr>
+                  </a:gs>
+                  <a:gs pos="100000">
+                    <a:schemeClr val="bg1">
+                      <a:lumMod val="85000"/>
+                    </a:schemeClr>
+                  </a:gs>
+                </a:gsLst>
+                <a:lin ang="5400000" scaled="1"/>
+              </a:gradFill>
+              <a:ln>
+                <a:solidFill>
+                  <a:schemeClr val="tx1"/>
+                </a:solidFill>
+              </a:ln>
+            </p:spPr>
+            <p:style>
+              <a:lnRef idx="2">
+                <a:schemeClr val="accent1">
+                  <a:shade val="50000"/>
+                </a:schemeClr>
+              </a:lnRef>
+              <a:fillRef idx="1">
+                <a:schemeClr val="accent1"/>
+              </a:fillRef>
+              <a:effectRef idx="0">
+                <a:schemeClr val="accent1"/>
+              </a:effectRef>
+              <a:fontRef idx="minor">
+                <a:schemeClr val="lt1"/>
+              </a:fontRef>
+            </p:style>
+            <p:txBody>
+              <a:bodyPr rtlCol="0" anchor="ctr"/>
+              <a:lstStyle/>
+              <a:p>
+                <a:pPr algn="ctr"/>
+                <a:endParaRPr lang="en-US"/>
+              </a:p>
+            </p:txBody>
+          </p:sp>
+          <p:sp>
+            <p:nvSpPr>
+              <p:cNvPr id="74" name="Oval 73">
+                <a:extLst>
+                  <a:ext uri="{FF2B5EF4-FFF2-40B4-BE49-F238E27FC236}">
+                    <a16:creationId xmlns:a16="http://schemas.microsoft.com/office/drawing/2014/main" id="{730FD21D-26BC-4E04-AB0E-7C611A60DD91}"/>
+                  </a:ext>
+                </a:extLst>
+              </p:cNvPr>
+              <p:cNvSpPr/>
+              <p:nvPr/>
+            </p:nvSpPr>
+            <p:spPr>
+              <a:xfrm>
+                <a:off x="12540682" y="17328625"/>
+                <a:ext cx="364768" cy="364768"/>
+              </a:xfrm>
+              <a:prstGeom prst="ellipse">
+                <a:avLst/>
+              </a:prstGeom>
+              <a:gradFill flip="none" rotWithShape="1">
+                <a:gsLst>
+                  <a:gs pos="0">
+                    <a:schemeClr val="accent2">
+                      <a:lumMod val="67000"/>
+                    </a:schemeClr>
+                  </a:gs>
+                  <a:gs pos="48000">
+                    <a:schemeClr val="accent2">
+                      <a:lumMod val="97000"/>
+                      <a:lumOff val="3000"/>
+                    </a:schemeClr>
+                  </a:gs>
+                  <a:gs pos="100000">
+                    <a:schemeClr val="accent2">
+                      <a:lumMod val="60000"/>
+                      <a:lumOff val="40000"/>
+                    </a:schemeClr>
+                  </a:gs>
+                </a:gsLst>
+                <a:lin ang="16200000" scaled="1"/>
+                <a:tileRect/>
+              </a:gradFill>
+              <a:ln>
+                <a:solidFill>
+                  <a:schemeClr val="tx1"/>
+                </a:solidFill>
+              </a:ln>
+            </p:spPr>
+            <p:style>
+              <a:lnRef idx="2">
+                <a:schemeClr val="accent1">
+                  <a:shade val="50000"/>
+                </a:schemeClr>
+              </a:lnRef>
+              <a:fillRef idx="1">
+                <a:schemeClr val="accent1"/>
+              </a:fillRef>
+              <a:effectRef idx="0">
+                <a:schemeClr val="accent1"/>
+              </a:effectRef>
+              <a:fontRef idx="minor">
+                <a:schemeClr val="lt1"/>
+              </a:fontRef>
+            </p:style>
+            <p:txBody>
+              <a:bodyPr rtlCol="0" anchor="ctr"/>
+              <a:lstStyle/>
+              <a:p>
+                <a:pPr algn="ctr"/>
+                <a:endParaRPr lang="en-US"/>
+              </a:p>
+            </p:txBody>
+          </p:sp>
+          <p:sp>
+            <p:nvSpPr>
+              <p:cNvPr id="75" name="Oval 74">
+                <a:extLst>
+                  <a:ext uri="{FF2B5EF4-FFF2-40B4-BE49-F238E27FC236}">
+                    <a16:creationId xmlns:a16="http://schemas.microsoft.com/office/drawing/2014/main" id="{F486BDD8-4F8E-49ED-9F17-0BBFB8533DA3}"/>
+                  </a:ext>
+                </a:extLst>
+              </p:cNvPr>
+              <p:cNvSpPr/>
+              <p:nvPr/>
+            </p:nvSpPr>
+            <p:spPr>
+              <a:xfrm>
+                <a:off x="15124681" y="16058610"/>
+                <a:ext cx="364768" cy="364768"/>
+              </a:xfrm>
+              <a:prstGeom prst="ellipse">
+                <a:avLst/>
+              </a:prstGeom>
+              <a:gradFill>
+                <a:gsLst>
+                  <a:gs pos="0">
+                    <a:schemeClr val="bg1"/>
+                  </a:gs>
+                  <a:gs pos="74000">
+                    <a:schemeClr val="bg1">
+                      <a:lumMod val="65000"/>
+                    </a:schemeClr>
+                  </a:gs>
+                  <a:gs pos="83000">
+                    <a:schemeClr val="bg1">
+                      <a:lumMod val="75000"/>
+                    </a:schemeClr>
+                  </a:gs>
+                  <a:gs pos="100000">
+                    <a:schemeClr val="bg1">
+                      <a:lumMod val="85000"/>
+                    </a:schemeClr>
+                  </a:gs>
+                </a:gsLst>
+                <a:lin ang="5400000" scaled="1"/>
+              </a:gradFill>
+              <a:ln>
+                <a:solidFill>
+                  <a:schemeClr val="tx1"/>
+                </a:solidFill>
+              </a:ln>
+            </p:spPr>
+            <p:style>
+              <a:lnRef idx="2">
+                <a:schemeClr val="accent1">
+                  <a:shade val="50000"/>
+                </a:schemeClr>
+              </a:lnRef>
+              <a:fillRef idx="1">
+                <a:schemeClr val="accent1"/>
+              </a:fillRef>
+              <a:effectRef idx="0">
+                <a:schemeClr val="accent1"/>
+              </a:effectRef>
+              <a:fontRef idx="minor">
+                <a:schemeClr val="lt1"/>
+              </a:fontRef>
+            </p:style>
+            <p:txBody>
+              <a:bodyPr rtlCol="0" anchor="ctr"/>
+              <a:lstStyle/>
+              <a:p>
+                <a:pPr algn="ctr"/>
+                <a:endParaRPr lang="en-US"/>
+              </a:p>
+            </p:txBody>
+          </p:sp>
+          <p:sp>
+            <p:nvSpPr>
+              <p:cNvPr id="76" name="Oval 75">
+                <a:extLst>
+                  <a:ext uri="{FF2B5EF4-FFF2-40B4-BE49-F238E27FC236}">
+                    <a16:creationId xmlns:a16="http://schemas.microsoft.com/office/drawing/2014/main" id="{BDA14C4F-8C51-44C3-B461-3EBEB369CEB1}"/>
+                  </a:ext>
+                </a:extLst>
+              </p:cNvPr>
+              <p:cNvSpPr/>
+              <p:nvPr/>
+            </p:nvSpPr>
+            <p:spPr>
+              <a:xfrm>
+                <a:off x="14824444" y="16729100"/>
+                <a:ext cx="364768" cy="364768"/>
+              </a:xfrm>
+              <a:prstGeom prst="ellipse">
+                <a:avLst/>
+              </a:prstGeom>
+              <a:gradFill flip="none" rotWithShape="1">
+                <a:gsLst>
+                  <a:gs pos="0">
+                    <a:schemeClr val="accent2">
+                      <a:lumMod val="67000"/>
+                    </a:schemeClr>
+                  </a:gs>
+                  <a:gs pos="48000">
+                    <a:schemeClr val="accent2">
+                      <a:lumMod val="97000"/>
+                      <a:lumOff val="3000"/>
+                    </a:schemeClr>
+                  </a:gs>
+                  <a:gs pos="100000">
+                    <a:schemeClr val="accent2">
+                      <a:lumMod val="60000"/>
+                      <a:lumOff val="40000"/>
+                    </a:schemeClr>
+                  </a:gs>
+                </a:gsLst>
+                <a:lin ang="16200000" scaled="1"/>
+                <a:tileRect/>
+              </a:gradFill>
+              <a:ln>
+                <a:solidFill>
+                  <a:schemeClr val="tx1"/>
+                </a:solidFill>
+              </a:ln>
+            </p:spPr>
+            <p:style>
+              <a:lnRef idx="2">
+                <a:schemeClr val="accent1">
+                  <a:shade val="50000"/>
+                </a:schemeClr>
+              </a:lnRef>
+              <a:fillRef idx="1">
+                <a:schemeClr val="accent1"/>
+              </a:fillRef>
+              <a:effectRef idx="0">
+                <a:schemeClr val="accent1"/>
+              </a:effectRef>
+              <a:fontRef idx="minor">
+                <a:schemeClr val="lt1"/>
+              </a:fontRef>
+            </p:style>
+            <p:txBody>
+              <a:bodyPr rtlCol="0" anchor="ctr"/>
+              <a:lstStyle/>
+              <a:p>
+                <a:pPr algn="ctr"/>
+                <a:endParaRPr lang="en-US"/>
+              </a:p>
+            </p:txBody>
+          </p:sp>
+          <p:sp>
+            <p:nvSpPr>
+              <p:cNvPr id="77" name="Oval 76">
+                <a:extLst>
+                  <a:ext uri="{FF2B5EF4-FFF2-40B4-BE49-F238E27FC236}">
+                    <a16:creationId xmlns:a16="http://schemas.microsoft.com/office/drawing/2014/main" id="{6457B991-B7E5-4181-BBE9-E1DB0792A747}"/>
+                  </a:ext>
+                </a:extLst>
+              </p:cNvPr>
+              <p:cNvSpPr/>
+              <p:nvPr/>
+            </p:nvSpPr>
+            <p:spPr>
+              <a:xfrm>
+                <a:off x="13463898" y="14582830"/>
+                <a:ext cx="364768" cy="364768"/>
+              </a:xfrm>
+              <a:prstGeom prst="ellipse">
+                <a:avLst/>
+              </a:prstGeom>
+              <a:gradFill>
+                <a:gsLst>
+                  <a:gs pos="0">
+                    <a:schemeClr val="bg1"/>
+                  </a:gs>
+                  <a:gs pos="74000">
+                    <a:schemeClr val="bg1">
+                      <a:lumMod val="65000"/>
+                    </a:schemeClr>
+                  </a:gs>
+                  <a:gs pos="83000">
+                    <a:schemeClr val="bg1">
+                      <a:lumMod val="75000"/>
+                    </a:schemeClr>
+                  </a:gs>
+                  <a:gs pos="100000">
+                    <a:schemeClr val="bg1">
+                      <a:lumMod val="85000"/>
+                    </a:schemeClr>
+                  </a:gs>
+                </a:gsLst>
+                <a:lin ang="5400000" scaled="1"/>
+              </a:gradFill>
+              <a:ln>
+                <a:solidFill>
+                  <a:schemeClr val="tx1"/>
+                </a:solidFill>
+              </a:ln>
+            </p:spPr>
+            <p:style>
+              <a:lnRef idx="2">
+                <a:schemeClr val="accent1">
+                  <a:shade val="50000"/>
+                </a:schemeClr>
+              </a:lnRef>
+              <a:fillRef idx="1">
+                <a:schemeClr val="accent1"/>
+              </a:fillRef>
+              <a:effectRef idx="0">
+                <a:schemeClr val="accent1"/>
+              </a:effectRef>
+              <a:fontRef idx="minor">
+                <a:schemeClr val="lt1"/>
+              </a:fontRef>
+            </p:style>
+            <p:txBody>
+              <a:bodyPr rtlCol="0" anchor="ctr"/>
+              <a:lstStyle/>
+              <a:p>
+                <a:pPr algn="ctr"/>
+                <a:endParaRPr lang="en-US"/>
+              </a:p>
+            </p:txBody>
+          </p:sp>
+        </p:grpSp>
+        <p:cxnSp>
+          <p:nvCxnSpPr>
+            <p:cNvPr id="78" name="Straight Arrow Connector 77">
+              <a:extLst>
+                <a:ext uri="{FF2B5EF4-FFF2-40B4-BE49-F238E27FC236}">
+                  <a16:creationId xmlns:a16="http://schemas.microsoft.com/office/drawing/2014/main" id="{4D67D860-C99E-4B5A-A232-42ABA3338C40}"/>
+                </a:ext>
+              </a:extLst>
+            </p:cNvPr>
+            <p:cNvCxnSpPr>
+              <a:cxnSpLocks/>
+            </p:cNvCxnSpPr>
+            <p:nvPr/>
+          </p:nvCxnSpPr>
+          <p:spPr>
+            <a:xfrm flipH="1">
+              <a:off x="13228709" y="16173180"/>
+              <a:ext cx="240553" cy="359900"/>
+            </a:xfrm>
+            <a:prstGeom prst="straightConnector1">
+              <a:avLst/>
+            </a:prstGeom>
+            <a:ln w="63500">
+              <a:solidFill>
+                <a:srgbClr val="C00000"/>
+              </a:solidFill>
+              <a:tailEnd type="triangle"/>
+            </a:ln>
+          </p:spPr>
+          <p:style>
+            <a:lnRef idx="1">
+              <a:schemeClr val="accent1"/>
+            </a:lnRef>
+            <a:fillRef idx="0">
+              <a:schemeClr val="accent1"/>
+            </a:fillRef>
+            <a:effectRef idx="0">
+              <a:schemeClr val="accent1"/>
+            </a:effectRef>
+            <a:fontRef idx="minor">
+              <a:schemeClr val="tx1"/>
+            </a:fontRef>
+          </p:style>
+        </p:cxnSp>
+        <p:cxnSp>
+          <p:nvCxnSpPr>
+            <p:cNvPr id="79" name="Straight Arrow Connector 78">
+              <a:extLst>
+                <a:ext uri="{FF2B5EF4-FFF2-40B4-BE49-F238E27FC236}">
+                  <a16:creationId xmlns:a16="http://schemas.microsoft.com/office/drawing/2014/main" id="{FDE4D91F-714E-431A-B68D-AEEC0F59B2B8}"/>
+                </a:ext>
+              </a:extLst>
+            </p:cNvPr>
+            <p:cNvCxnSpPr>
+              <a:cxnSpLocks/>
+            </p:cNvCxnSpPr>
+            <p:nvPr/>
+          </p:nvCxnSpPr>
+          <p:spPr>
+            <a:xfrm flipV="1">
+              <a:off x="12826926" y="16985244"/>
+              <a:ext cx="158550" cy="327267"/>
+            </a:xfrm>
+            <a:prstGeom prst="straightConnector1">
+              <a:avLst/>
+            </a:prstGeom>
+            <a:ln w="63500">
+              <a:solidFill>
+                <a:srgbClr val="C00000"/>
+              </a:solidFill>
+              <a:tailEnd type="triangle"/>
+            </a:ln>
+          </p:spPr>
+          <p:style>
+            <a:lnRef idx="1">
+              <a:schemeClr val="accent1"/>
+            </a:lnRef>
+            <a:fillRef idx="0">
+              <a:schemeClr val="accent1"/>
+            </a:fillRef>
+            <a:effectRef idx="0">
+              <a:schemeClr val="accent1"/>
+            </a:effectRef>
+            <a:fontRef idx="minor">
+              <a:schemeClr val="tx1"/>
+            </a:fontRef>
+          </p:style>
+        </p:cxnSp>
+        <mc:AlternateContent xmlns:mc="http://schemas.openxmlformats.org/markup-compatibility/2006">
+          <mc:Choice xmlns:a14="http://schemas.microsoft.com/office/drawing/2010/main" Requires="a14">
+            <p:sp>
+              <p:nvSpPr>
+                <p:cNvPr id="80" name="Rectangle 79">
+                  <a:extLst>
+                    <a:ext uri="{FF2B5EF4-FFF2-40B4-BE49-F238E27FC236}">
+                      <a16:creationId xmlns:a16="http://schemas.microsoft.com/office/drawing/2014/main" id="{51C86FE6-47E8-42E3-946B-6244A6FB9875}"/>
+                    </a:ext>
+                  </a:extLst>
+                </p:cNvPr>
+                <p:cNvSpPr/>
+                <p:nvPr/>
+              </p:nvSpPr>
+              <p:spPr>
+                <a:xfrm>
+                  <a:off x="12961816" y="15923596"/>
+                  <a:ext cx="514051" cy="400110"/>
+                </a:xfrm>
+                <a:prstGeom prst="rect">
+                  <a:avLst/>
+                </a:prstGeom>
+              </p:spPr>
+              <p:txBody>
+                <a:bodyPr wrap="none">
+                  <a:spAutoFit/>
+                </a:bodyPr>
+                <a:lstStyle/>
+                <a:p>
+                  <a:pPr/>
+                  <a14:m>
+                    <m:oMathPara xmlns:m="http://schemas.openxmlformats.org/officeDocument/2006/math">
+                      <m:oMathParaPr>
+                        <m:jc m:val="centerGroup"/>
+                      </m:oMathParaPr>
+                      <m:oMath xmlns:m="http://schemas.openxmlformats.org/officeDocument/2006/math">
+                        <m:sSub>
+                          <m:sSubPr>
+                            <m:ctrlPr>
+                              <a:rPr lang="en-US" sz="2000" i="1" smtClean="0">
+                                <a:latin typeface="Cambria Math" panose="02040503050406030204" pitchFamily="18" charset="0"/>
+                              </a:rPr>
+                            </m:ctrlPr>
+                          </m:sSubPr>
+                          <m:e>
+                            <m:r>
+                              <a:rPr lang="en-US" sz="2000" b="0" i="1" smtClean="0">
+                                <a:latin typeface="Cambria Math" panose="02040503050406030204" pitchFamily="18" charset="0"/>
+                              </a:rPr>
+                              <m:t>𝛽</m:t>
+                            </m:r>
+                          </m:e>
+                          <m:sub>
+                            <m:r>
+                              <a:rPr lang="en-US" sz="2000" i="1">
+                                <a:latin typeface="Cambria Math" panose="02040503050406030204" pitchFamily="18" charset="0"/>
+                              </a:rPr>
+                              <m:t>3</m:t>
+                            </m:r>
+                          </m:sub>
+                        </m:sSub>
+                      </m:oMath>
+                    </m:oMathPara>
+                  </a14:m>
+                  <a:endParaRPr lang="en-US" sz="2000" dirty="0"/>
+                </a:p>
+              </p:txBody>
+            </p:sp>
+          </mc:Choice>
+          <mc:Fallback>
+            <p:sp>
+              <p:nvSpPr>
+                <p:cNvPr id="80" name="Rectangle 79">
+                  <a:extLst>
+                    <a:ext uri="{FF2B5EF4-FFF2-40B4-BE49-F238E27FC236}">
+                      <a16:creationId xmlns:a16="http://schemas.microsoft.com/office/drawing/2014/main" id="{51C86FE6-47E8-42E3-946B-6244A6FB9875}"/>
+                    </a:ext>
+                  </a:extLst>
+                </p:cNvPr>
+                <p:cNvSpPr>
+                  <a:spLocks noRot="1" noChangeAspect="1" noMove="1" noResize="1" noEditPoints="1" noAdjustHandles="1" noChangeArrowheads="1" noChangeShapeType="1" noTextEdit="1"/>
+                </p:cNvSpPr>
+                <p:nvPr/>
+              </p:nvSpPr>
+              <p:spPr>
+                <a:xfrm>
+                  <a:off x="12961816" y="15923596"/>
+                  <a:ext cx="514051" cy="400110"/>
+                </a:xfrm>
+                <a:prstGeom prst="rect">
+                  <a:avLst/>
+                </a:prstGeom>
+                <a:blipFill>
+                  <a:blip r:embed="rId4"/>
+                  <a:stretch>
+                    <a:fillRect b="-18462"/>
+                  </a:stretch>
+                </a:blipFill>
+              </p:spPr>
+              <p:txBody>
+                <a:bodyPr/>
+                <a:lstStyle/>
+                <a:p>
+                  <a:r>
+                    <a:rPr lang="en-US">
+                      <a:noFill/>
+                    </a:rPr>
+                    <a:t> </a:t>
+                  </a:r>
+                </a:p>
+              </p:txBody>
+            </p:sp>
+          </mc:Fallback>
+        </mc:AlternateContent>
+        <mc:AlternateContent xmlns:mc="http://schemas.openxmlformats.org/markup-compatibility/2006">
+          <mc:Choice xmlns:a14="http://schemas.microsoft.com/office/drawing/2010/main" Requires="a14">
+            <p:sp>
+              <p:nvSpPr>
+                <p:cNvPr id="81" name="Rectangle 80">
+                  <a:extLst>
+                    <a:ext uri="{FF2B5EF4-FFF2-40B4-BE49-F238E27FC236}">
+                      <a16:creationId xmlns:a16="http://schemas.microsoft.com/office/drawing/2014/main" id="{C21E0B39-68FE-43B6-B22C-A8D4D7C3AC11}"/>
+                    </a:ext>
+                  </a:extLst>
+                </p:cNvPr>
+                <p:cNvSpPr/>
+                <p:nvPr/>
+              </p:nvSpPr>
+              <p:spPr>
+                <a:xfrm>
+                  <a:off x="12392351" y="16806064"/>
+                  <a:ext cx="514050" cy="400110"/>
+                </a:xfrm>
+                <a:prstGeom prst="rect">
+                  <a:avLst/>
+                </a:prstGeom>
+              </p:spPr>
+              <p:txBody>
+                <a:bodyPr wrap="none">
+                  <a:spAutoFit/>
+                </a:bodyPr>
+                <a:lstStyle/>
+                <a:p>
+                  <a:pPr/>
                   <a14:m>
                     <m:oMathPara xmlns:m="http://schemas.openxmlformats.org/officeDocument/2006/math">
                       <m:oMathParaPr>
@@ -38872,10 +40408,10 @@
           <mc:Fallback>
             <p:sp>
               <p:nvSpPr>
-                <p:cNvPr id="52" name="Rectangle 51">
+                <p:cNvPr id="81" name="Rectangle 80">
                   <a:extLst>
                     <a:ext uri="{FF2B5EF4-FFF2-40B4-BE49-F238E27FC236}">
-                      <a16:creationId xmlns:a16="http://schemas.microsoft.com/office/drawing/2014/main" id="{727F33BF-F7AE-4E5B-9920-A6A6CCB6335A}"/>
+                      <a16:creationId xmlns:a16="http://schemas.microsoft.com/office/drawing/2014/main" id="{C21E0B39-68FE-43B6-B22C-A8D4D7C3AC11}"/>
                     </a:ext>
                   </a:extLst>
                 </p:cNvPr>
@@ -38886,14 +40422,14 @@
               </p:nvSpPr>
               <p:spPr>
                 <a:xfrm>
-                  <a:off x="8220469" y="16212020"/>
+                  <a:off x="12392351" y="16806064"/>
                   <a:ext cx="514050" cy="400110"/>
                 </a:xfrm>
                 <a:prstGeom prst="rect">
                   <a:avLst/>
                 </a:prstGeom>
                 <a:blipFill>
-                  <a:blip r:embed="rId3"/>
+                  <a:blip r:embed="rId5"/>
                   <a:stretch>
                     <a:fillRect b="-16667"/>
                   </a:stretch>

</xml_diff>